<commit_message>
Fix Technology Stack to max 3 items and regenerate Azure solution PPTX files
Applied content length guideline enforcement:
- Technology Stack must have max 3 sub-items per Solution Overview slide

Solutions fixed:
- enterprise-landing-zone: 4→3 items (merged Platform+Governance, consolidated)
- sentinel-siem: 4→3 items (merged Platform+Core Service, consolidated Integration)
- enterprise-platform: 4→3 items (merged Platform+Source Control, consolidated)
- virtual-wan-global: 4→3 items (merged Platform+Routing, kept Security+Monitoring)
- virtual-desktop: 6→3 items (consolidated into Platform, Storage+Identity, Security+Monitoring)

All PPTX files successfully regenerated (Nov 22 17:17-17:18).

🤖 Generated with Claude Code (https://claude.com/claude-code)

Co-Authored-By: Claude <noreply@anthropic.com>
</commit_message>
<xml_diff>
--- a/solutions/azure/cloud/enterprise-landing-zone/presales/solution-briefing.pptx
+++ b/solutions/azure/cloud/enterprise-landing-zone/presales/solution-briefing.pptx
@@ -4861,19 +4861,13 @@
           <a:p>
             <a:pPr lvl="1"/>
             <a:r>
-              <a:t>Cloud Platform: Microsoft Azure</a:t>
+              <a:t>Platform: Microsoft Azure with Management Groups and Policy framework</a:t>
             </a:r>
           </a:p>
           <a:p>
             <a:pPr lvl="1"/>
             <a:r>
-              <a:t>Governance: Azure Policy, Azure Blueprints, Azure Resource Graph</a:t>
-            </a:r>
-          </a:p>
-          <a:p>
-            <a:pPr lvl="1"/>
-            <a:r>
-              <a:t>Identity: Azure Active Directory with RBAC</a:t>
+              <a:t>Governance: Azure Policy, Blueprints, Resource Graph, RBAC</a:t>
             </a:r>
           </a:p>
           <a:p>

</xml_diff>